<commit_message>
Welcome & agenda slides
</commit_message>
<xml_diff>
--- a/slides/welcome_agenda.pptx
+++ b/slides/welcome_agenda.pptx
@@ -5,7 +5,7 @@
     <p:sldMasterId id="2147483660" r:id="rId1"/>
   </p:sldMasterIdLst>
   <p:notesMasterIdLst>
-    <p:notesMasterId r:id="rId7"/>
+    <p:notesMasterId r:id="rId8"/>
   </p:notesMasterIdLst>
   <p:sldIdLst>
     <p:sldId id="258" r:id="rId2"/>
@@ -13,6 +13,7 @@
     <p:sldId id="260" r:id="rId4"/>
     <p:sldId id="261" r:id="rId5"/>
     <p:sldId id="262" r:id="rId6"/>
+    <p:sldId id="263" r:id="rId7"/>
   </p:sldIdLst>
   <p:sldSz cx="9144000" cy="6858000" type="screen4x3"/>
   <p:notesSz cx="6858000" cy="9144000"/>
@@ -113,7 +114,7 @@
   </p:defaultTextStyle>
   <p:extLst>
     <p:ext uri="{EFAFB233-063F-42B5-8137-9DF3F51BA10A}">
-      <p15:sldGuideLst xmlns="" xmlns:p15="http://schemas.microsoft.com/office/powerpoint/2012/main">
+      <p15:sldGuideLst xmlns:p15="http://schemas.microsoft.com/office/powerpoint/2012/main" xmlns="">
         <p15:guide id="1" orient="horz" pos="2160">
           <p15:clr>
             <a:srgbClr val="A4A3A4"/>
@@ -212,7 +213,7 @@
           <a:p>
             <a:fld id="{F01141F9-3E73-7448-86C2-E96D93FE379F}" type="datetimeFigureOut">
               <a:rPr lang="en-US" smtClean="0"/>
-              <a:t>25/05/15</a:t>
+              <a:t>01/06/15</a:t>
             </a:fld>
             <a:endParaRPr lang="en-US"/>
           </a:p>
@@ -684,6 +685,36 @@
           <a:xfrm>
             <a:off x="3354358" y="1305832"/>
             <a:ext cx="2439612" cy="2439612"/>
+          </a:xfrm>
+          <a:prstGeom prst="rect">
+            <a:avLst/>
+          </a:prstGeom>
+        </p:spPr>
+      </p:pic>
+      <p:pic>
+        <p:nvPicPr>
+          <p:cNvPr id="6" name="Picture 5" descr="avatar_emerald_200.png"/>
+          <p:cNvPicPr>
+            <a:picLocks noChangeAspect="1"/>
+          </p:cNvPicPr>
+          <p:nvPr userDrawn="1"/>
+        </p:nvPicPr>
+        <p:blipFill>
+          <a:blip r:embed="rId3" cstate="screen">
+            <a:extLst>
+              <a:ext uri="{28A0092B-C50C-407E-A947-70E740481C1C}">
+                <a14:useLocalDpi xmlns:a14="http://schemas.microsoft.com/office/drawing/2010/main"/>
+              </a:ext>
+            </a:extLst>
+          </a:blip>
+          <a:stretch>
+            <a:fillRect/>
+          </a:stretch>
+        </p:blipFill>
+        <p:spPr>
+          <a:xfrm>
+            <a:off x="8022838" y="382257"/>
+            <a:ext cx="663961" cy="660641"/>
           </a:xfrm>
           <a:prstGeom prst="rect">
             <a:avLst/>
@@ -3980,7 +4011,11 @@
           <a:p>
             <a:r>
               <a:rPr lang="en-US" dirty="0" smtClean="0"/>
-              <a:t>Apache Flink® Training</a:t>
+              <a:t>Apache Flink® </a:t>
+            </a:r>
+            <a:r>
+              <a:rPr lang="en-US" dirty="0" smtClean="0"/>
+              <a:t>Training</a:t>
             </a:r>
             <a:endParaRPr lang="en-US" dirty="0"/>
           </a:p>
@@ -4019,6 +4054,13 @@
   <p:clrMapOvr>
     <a:masterClrMapping/>
   </p:clrMapOvr>
+  <p:timing>
+    <p:tnLst>
+      <p:par>
+        <p:cTn xmlns:p14="http://schemas.microsoft.com/office/powerpoint/2010/main" id="1" dur="indefinite" restart="never" nodeType="tmRoot"/>
+      </p:par>
+    </p:tnLst>
+  </p:timing>
 </p:sld>
 </file>
 
@@ -4077,7 +4119,43 @@
           <a:bodyPr/>
           <a:lstStyle/>
           <a:p>
-            <a:endParaRPr lang="en-US"/>
+            <a:r>
+              <a:rPr lang="en-US" dirty="0" smtClean="0"/>
+              <a:t>Hope you enjoyed Berlin Buzzwords</a:t>
+            </a:r>
+          </a:p>
+          <a:p>
+            <a:endParaRPr lang="en-US" dirty="0" smtClean="0"/>
+          </a:p>
+          <a:p>
+            <a:r>
+              <a:rPr lang="en-US" dirty="0" smtClean="0"/>
+              <a:t>Thanks Google for hosting!</a:t>
+            </a:r>
+          </a:p>
+          <a:p>
+            <a:endParaRPr lang="en-US" dirty="0"/>
+          </a:p>
+          <a:p>
+            <a:r>
+              <a:rPr lang="en-US" dirty="0" smtClean="0"/>
+              <a:t>First Flink training </a:t>
+            </a:r>
+          </a:p>
+          <a:p>
+            <a:pPr lvl="1"/>
+            <a:r>
+              <a:rPr lang="en-US" dirty="0" smtClean="0"/>
+              <a:t>Please give feedback.</a:t>
+            </a:r>
+          </a:p>
+          <a:p>
+            <a:pPr lvl="1"/>
+            <a:r>
+              <a:rPr lang="en-US" dirty="0" smtClean="0"/>
+              <a:t>What can we do better?</a:t>
+            </a:r>
+            <a:endParaRPr lang="en-US" dirty="0"/>
           </a:p>
         </p:txBody>
       </p:sp>
@@ -4127,6 +4205,13 @@
   <p:clrMapOvr>
     <a:masterClrMapping/>
   </p:clrMapOvr>
+  <p:timing>
+    <p:tnLst>
+      <p:par>
+        <p:cTn xmlns:p14="http://schemas.microsoft.com/office/powerpoint/2010/main" id="1" dur="indefinite" restart="never" nodeType="tmRoot"/>
+      </p:par>
+    </p:tnLst>
+  </p:timing>
 </p:sld>
 </file>
 
@@ -4164,7 +4249,7 @@
           <a:p>
             <a:r>
               <a:rPr lang="en-US" dirty="0" smtClean="0"/>
-              <a:t>What will we do?</a:t>
+              <a:t>What will you learn?</a:t>
             </a:r>
             <a:endParaRPr lang="en-US" dirty="0"/>
           </a:p>
@@ -4182,41 +4267,91 @@
         </p:nvSpPr>
         <p:spPr/>
         <p:txBody>
-          <a:bodyPr/>
+          <a:bodyPr>
+            <a:normAutofit fontScale="92500" lnSpcReduction="10000"/>
+          </a:bodyPr>
           <a:lstStyle/>
           <a:p>
+            <a:pPr marL="0" indent="0" algn="ctr" fontAlgn="base">
+              <a:buNone/>
+            </a:pPr>
+            <a:r>
+              <a:rPr lang="en-US" sz="3500" dirty="0" smtClean="0"/>
+              <a:t>Develop Flink programs!</a:t>
+            </a:r>
+            <a:endParaRPr lang="en-US" sz="3500" dirty="0" smtClean="0"/>
+          </a:p>
+          <a:p>
+            <a:pPr lvl="1" fontAlgn="base"/>
+            <a:endParaRPr lang="en-US" dirty="0" smtClean="0"/>
+          </a:p>
+          <a:p>
             <a:pPr fontAlgn="base"/>
             <a:r>
+              <a:rPr lang="en-US" sz="3000" dirty="0" smtClean="0"/>
+              <a:t>Setup </a:t>
+            </a:r>
+            <a:r>
+              <a:rPr lang="en-US" sz="3000" dirty="0"/>
+              <a:t>a local </a:t>
+            </a:r>
+            <a:r>
+              <a:rPr lang="en-US" sz="3000" dirty="0" smtClean="0"/>
+              <a:t>development </a:t>
+            </a:r>
+            <a:r>
+              <a:rPr lang="en-US" sz="3000" dirty="0"/>
+              <a:t>environment</a:t>
+            </a:r>
+          </a:p>
+          <a:p>
+            <a:pPr fontAlgn="base"/>
+            <a:endParaRPr lang="en-US" sz="2800" dirty="0" smtClean="0"/>
+          </a:p>
+          <a:p>
+            <a:pPr fontAlgn="base"/>
+            <a:r>
+              <a:rPr lang="en-US" sz="3000" dirty="0" smtClean="0"/>
+              <a:t>Write, execute &amp; debug programs in your IDE</a:t>
+            </a:r>
+          </a:p>
+          <a:p>
+            <a:pPr lvl="1" fontAlgn="base"/>
+            <a:r>
+              <a:rPr lang="en-US" dirty="0" err="1" smtClean="0"/>
+              <a:t>DataSet</a:t>
+            </a:r>
+            <a:r>
               <a:rPr lang="en-US" dirty="0" smtClean="0"/>
-              <a:t>Setup </a:t>
-            </a:r>
-            <a:r>
-              <a:rPr lang="en-US" dirty="0"/>
-              <a:t>a local </a:t>
-            </a:r>
-            <a:r>
-              <a:rPr lang="en-US" dirty="0" err="1"/>
-              <a:t>dev</a:t>
-            </a:r>
-            <a:r>
-              <a:rPr lang="en-US" dirty="0"/>
-              <a:t> environment</a:t>
-            </a:r>
+              <a:t> API (batch)</a:t>
+            </a:r>
+          </a:p>
+          <a:p>
+            <a:pPr lvl="1" fontAlgn="base"/>
+            <a:r>
+              <a:rPr lang="en-US" dirty="0" smtClean="0"/>
+              <a:t>Table API (batch)</a:t>
+            </a:r>
+            <a:endParaRPr lang="en-US" sz="1000" dirty="0" smtClean="0"/>
           </a:p>
           <a:p>
             <a:pPr fontAlgn="base"/>
-            <a:endParaRPr lang="en-US" dirty="0" smtClean="0"/>
+            <a:endParaRPr lang="en-US" sz="2800" dirty="0" smtClean="0"/>
           </a:p>
           <a:p>
             <a:pPr fontAlgn="base"/>
             <a:r>
-              <a:rPr lang="en-US" dirty="0" smtClean="0"/>
-              <a:t>Writing</a:t>
-            </a:r>
-            <a:r>
-              <a:rPr lang="en-US" dirty="0"/>
-              <a:t>, executing, debugging, monitoring batch programs</a:t>
-            </a:r>
+              <a:rPr lang="en-US" sz="3000" dirty="0" smtClean="0"/>
+              <a:t>Package &amp; execute programs on </a:t>
+            </a:r>
+            <a:br>
+              <a:rPr lang="en-US" sz="3000" dirty="0" smtClean="0"/>
+            </a:br>
+            <a:r>
+              <a:rPr lang="en-US" sz="3000" dirty="0" smtClean="0"/>
+              <a:t>a (local) Flink setup</a:t>
+            </a:r>
+            <a:endParaRPr lang="en-US" sz="3900" dirty="0"/>
           </a:p>
           <a:p>
             <a:endParaRPr lang="en-US" dirty="0"/>
@@ -4269,6 +4404,13 @@
   <p:clrMapOvr>
     <a:masterClrMapping/>
   </p:clrMapOvr>
+  <p:timing>
+    <p:tnLst>
+      <p:par>
+        <p:cTn xmlns:p14="http://schemas.microsoft.com/office/powerpoint/2010/main" id="1" dur="indefinite" restart="never" nodeType="tmRoot"/>
+      </p:par>
+    </p:tnLst>
+  </p:timing>
 </p:sld>
 </file>
 
@@ -4306,7 +4448,7 @@
           <a:p>
             <a:r>
               <a:rPr lang="en-US" dirty="0" smtClean="0"/>
-              <a:t>What won’t we do?</a:t>
+              <a:t>What’s out of scope? :-(</a:t>
             </a:r>
             <a:endParaRPr lang="en-US" dirty="0"/>
           </a:p>
@@ -4322,52 +4464,68 @@
             <p:ph idx="1"/>
           </p:nvPr>
         </p:nvSpPr>
-        <p:spPr/>
-        <p:txBody>
-          <a:bodyPr/>
+        <p:spPr>
+          <a:xfrm>
+            <a:off x="457199" y="1474376"/>
+            <a:ext cx="8455125" cy="4651788"/>
+          </a:xfrm>
+        </p:spPr>
+        <p:txBody>
+          <a:bodyPr>
+            <a:normAutofit/>
+          </a:bodyPr>
           <a:lstStyle/>
           <a:p>
-            <a:endParaRPr lang="en-US" dirty="0"/>
-          </a:p>
-          <a:p>
-            <a:pPr fontAlgn="base"/>
-            <a:r>
-              <a:rPr lang="en-US" dirty="0"/>
-              <a:t>Streaming, </a:t>
-            </a:r>
             <a:r>
               <a:rPr lang="en-US" dirty="0" smtClean="0"/>
-              <a:t>Batch Iterations, </a:t>
-            </a:r>
+              <a:t>DataStream API (streamin</a:t>
+            </a:r>
+            <a:r>
+              <a:rPr lang="en-US" dirty="0" smtClean="0"/>
+              <a:t>g)</a:t>
+            </a:r>
+            <a:endParaRPr lang="en-US" dirty="0" smtClean="0"/>
+          </a:p>
+          <a:p>
             <a:r>
               <a:rPr lang="en-US" dirty="0" err="1" smtClean="0"/>
               <a:t>Gelly</a:t>
             </a:r>
             <a:r>
+              <a:rPr lang="en-US" dirty="0" smtClean="0"/>
+              <a:t> (Graph API &amp; library)</a:t>
+            </a:r>
+          </a:p>
+          <a:p>
+            <a:r>
+              <a:rPr lang="en-US" dirty="0" smtClean="0"/>
+              <a:t>Flink ML</a:t>
+            </a:r>
+          </a:p>
+          <a:p>
+            <a:r>
               <a:rPr lang="en-US" dirty="0"/>
-              <a:t>, </a:t>
-            </a:r>
+              <a:t>Batch Iterations</a:t>
+            </a:r>
+          </a:p>
+          <a:p>
             <a:r>
               <a:rPr lang="en-US" dirty="0" smtClean="0"/>
-              <a:t>ML</a:t>
-            </a:r>
-            <a:endParaRPr lang="en-US" dirty="0"/>
+              <a:t>Cluster setup &amp; configuration</a:t>
+            </a:r>
           </a:p>
           <a:p>
             <a:pPr fontAlgn="base"/>
-            <a:r>
-              <a:rPr lang="en-US" dirty="0"/>
-              <a:t>Cluster setup, configuration</a:t>
-            </a:r>
-          </a:p>
-          <a:p>
-            <a:pPr fontAlgn="base"/>
-            <a:r>
-              <a:rPr lang="en-US" dirty="0"/>
-              <a:t>ask if anybody is interested in that and offer help</a:t>
-            </a:r>
-          </a:p>
-          <a:p>
+            <a:endParaRPr lang="en-US" dirty="0" smtClean="0"/>
+          </a:p>
+          <a:p>
+            <a:pPr marL="0" indent="0" fontAlgn="base">
+              <a:buNone/>
+            </a:pPr>
+            <a:r>
+              <a:rPr lang="en-US" dirty="0" smtClean="0"/>
+              <a:t>Talk to us if you are interested in any of this!</a:t>
+            </a:r>
             <a:endParaRPr lang="en-US" dirty="0"/>
           </a:p>
         </p:txBody>
@@ -4418,6 +4576,13 @@
   <p:clrMapOvr>
     <a:masterClrMapping/>
   </p:clrMapOvr>
+  <p:timing>
+    <p:tnLst>
+      <p:par>
+        <p:cTn xmlns:p14="http://schemas.microsoft.com/office/powerpoint/2010/main" id="1" dur="indefinite" restart="never" nodeType="tmRoot"/>
+      </p:par>
+    </p:tnLst>
+  </p:timing>
 </p:sld>
 </file>
 
@@ -4484,27 +4649,59 @@
                   <a:srgbClr val="FF6600"/>
                 </a:solidFill>
               </a:rPr>
-              <a:t>10:15	Presentation: Flink Overview</a:t>
-            </a:r>
-          </a:p>
-          <a:p>
+              <a:t>09</a:t>
+            </a:r>
             <a:r>
               <a:rPr lang="en-US" sz="2400" dirty="0" smtClean="0">
                 <a:solidFill>
+                  <a:srgbClr val="FF6600"/>
+                </a:solidFill>
+              </a:rPr>
+              <a:t>:</a:t>
+            </a:r>
+            <a:r>
+              <a:rPr lang="en-US" sz="2400" dirty="0" smtClean="0">
+                <a:solidFill>
+                  <a:srgbClr val="FF6600"/>
+                </a:solidFill>
+              </a:rPr>
+              <a:t>15	Presentation: Flink Overview</a:t>
+            </a:r>
+          </a:p>
+          <a:p>
+            <a:r>
+              <a:rPr lang="en-US" sz="2400" dirty="0" smtClean="0">
+                <a:solidFill>
                   <a:srgbClr val="0000FF"/>
                 </a:solidFill>
               </a:rPr>
-              <a:t>11:00	Hands-on: Setup Development Environment</a:t>
-            </a:r>
-          </a:p>
-          <a:p>
+              <a:t>10:</a:t>
+            </a:r>
             <a:r>
               <a:rPr lang="en-US" sz="2400" dirty="0" smtClean="0">
                 <a:solidFill>
+                  <a:srgbClr val="0000FF"/>
+                </a:solidFill>
+              </a:rPr>
+              <a:t>00	Hands-on: Setup Development Environment</a:t>
+            </a:r>
+          </a:p>
+          <a:p>
+            <a:r>
+              <a:rPr lang="en-US" sz="2400" dirty="0" smtClean="0">
+                <a:solidFill>
                   <a:srgbClr val="FF6600"/>
                 </a:solidFill>
               </a:rPr>
-              <a:t>11:30	Presentation: </a:t>
+              <a:t>10:</a:t>
+            </a:r>
+            <a:r>
+              <a:rPr lang="en-US" sz="2400" dirty="0" smtClean="0">
+                <a:solidFill>
+                  <a:srgbClr val="FF6600"/>
+                </a:solidFill>
+              </a:rPr>
+              <a:t>30	Presentation: </a:t>
             </a:r>
             <a:r>
               <a:rPr lang="en-US" sz="2400" dirty="0" err="1" smtClean="0">
@@ -4520,40 +4717,36 @@
                   <a:srgbClr val="FF6600"/>
                 </a:solidFill>
               </a:rPr>
-              <a:t> API Basics</a:t>
-            </a:r>
-          </a:p>
-          <a:p>
+              <a:t> API </a:t>
+            </a:r>
             <a:r>
               <a:rPr lang="en-US" sz="2400" dirty="0" smtClean="0">
                 <a:solidFill>
-                  <a:srgbClr val="008000"/>
+                  <a:srgbClr val="FF6600"/>
                 </a:solidFill>
               </a:rPr>
-              <a:t>12:30	Lunch break</a:t>
+              <a:t>Basics</a:t>
             </a:r>
           </a:p>
           <a:p>
             <a:r>
               <a:rPr lang="en-US" sz="2400" dirty="0" smtClean="0">
                 <a:solidFill>
-                  <a:srgbClr val="660066"/>
+                  <a:srgbClr val="0000FF"/>
                 </a:solidFill>
               </a:rPr>
-              <a:t>13:15	Google Presentation Slot</a:t>
-            </a:r>
-          </a:p>
-          <a:p>
-            <a:r>
-              <a:rPr lang="en-US" sz="2400" dirty="0" smtClean="0">
+              <a:t>11:30</a:t>
+            </a:r>
+            <a:r>
+              <a:rPr lang="en-US" sz="2400" dirty="0">
                 <a:solidFill>
                   <a:srgbClr val="0000FF"/>
                 </a:solidFill>
               </a:rPr>
-              <a:t>13:45	Hands-on: Basic </a:t>
-            </a:r>
-            <a:r>
-              <a:rPr lang="en-US" sz="2400" dirty="0" err="1" smtClean="0">
+              <a:t>	Hands-on: Basic </a:t>
+            </a:r>
+            <a:r>
+              <a:rPr lang="en-US" sz="2400" dirty="0" err="1">
                 <a:solidFill>
                   <a:srgbClr val="0000FF"/>
                 </a:solidFill>
@@ -4561,7 +4754,7 @@
               <a:t>DataSet</a:t>
             </a:r>
             <a:r>
-              <a:rPr lang="en-US" sz="2400" dirty="0" smtClean="0">
+              <a:rPr lang="en-US" sz="2400" dirty="0">
                 <a:solidFill>
                   <a:srgbClr val="0000FF"/>
                 </a:solidFill>
@@ -4573,10 +4766,62 @@
             <a:r>
               <a:rPr lang="en-US" sz="2400" dirty="0" smtClean="0">
                 <a:solidFill>
+                  <a:srgbClr val="008000"/>
+                </a:solidFill>
+              </a:rPr>
+              <a:t>13:00</a:t>
+            </a:r>
+            <a:r>
+              <a:rPr lang="en-US" sz="2400" dirty="0" smtClean="0">
+                <a:solidFill>
+                  <a:srgbClr val="008000"/>
+                </a:solidFill>
+              </a:rPr>
+              <a:t>	Lunch break</a:t>
+            </a:r>
+          </a:p>
+          <a:p>
+            <a:r>
+              <a:rPr lang="en-US" sz="2400" dirty="0" smtClean="0">
+                <a:solidFill>
+                  <a:srgbClr val="660066"/>
+                </a:solidFill>
+              </a:rPr>
+              <a:t>13</a:t>
+            </a:r>
+            <a:r>
+              <a:rPr lang="en-US" sz="2400" dirty="0" smtClean="0">
+                <a:solidFill>
+                  <a:srgbClr val="660066"/>
+                </a:solidFill>
+              </a:rPr>
+              <a:t>:45</a:t>
+            </a:r>
+            <a:r>
+              <a:rPr lang="en-US" sz="2400" dirty="0" smtClean="0">
+                <a:solidFill>
+                  <a:srgbClr val="660066"/>
+                </a:solidFill>
+              </a:rPr>
+              <a:t>	Google Presentation Slot</a:t>
+            </a:r>
+          </a:p>
+          <a:p>
+            <a:r>
+              <a:rPr lang="en-US" sz="2400" dirty="0" smtClean="0">
+                <a:solidFill>
                   <a:srgbClr val="FF6600"/>
                 </a:solidFill>
               </a:rPr>
-              <a:t>15:15	Presentation: </a:t>
+              <a:t>14:00</a:t>
+            </a:r>
+            <a:r>
+              <a:rPr lang="en-US" sz="2400" dirty="0" smtClean="0">
+                <a:solidFill>
+                  <a:srgbClr val="FF6600"/>
+                </a:solidFill>
+              </a:rPr>
+              <a:t>	Presentation: </a:t>
             </a:r>
             <a:r>
               <a:rPr lang="en-US" sz="2400" dirty="0" err="1" smtClean="0">
@@ -4602,7 +4847,15 @@
                   <a:srgbClr val="0000FF"/>
                 </a:solidFill>
               </a:rPr>
-              <a:t>16:00	Hands-on: Advanced </a:t>
+              <a:t>15:</a:t>
+            </a:r>
+            <a:r>
+              <a:rPr lang="en-US" sz="2400" dirty="0" smtClean="0">
+                <a:solidFill>
+                  <a:srgbClr val="0000FF"/>
+                </a:solidFill>
+              </a:rPr>
+              <a:t>00	Hands-on: Advanced </a:t>
             </a:r>
             <a:r>
               <a:rPr lang="en-US" sz="2400" dirty="0" err="1" smtClean="0">
@@ -4628,17 +4881,41 @@
                   <a:srgbClr val="FF6600"/>
                 </a:solidFill>
               </a:rPr>
-              <a:t>18:00	Wrap-up &amp; Outlook</a:t>
-            </a:r>
-          </a:p>
-          <a:p>
+              <a:t>17:</a:t>
+            </a:r>
             <a:r>
               <a:rPr lang="en-US" sz="2400" dirty="0" smtClean="0">
                 <a:solidFill>
+                  <a:srgbClr val="FF6600"/>
+                </a:solidFill>
+              </a:rPr>
+              <a:t>00	Wrap-up &amp; </a:t>
+            </a:r>
+            <a:r>
+              <a:rPr lang="en-US" sz="2400" dirty="0" smtClean="0">
+                <a:solidFill>
+                  <a:srgbClr val="FF6600"/>
+                </a:solidFill>
+              </a:rPr>
+              <a:t>Outlook</a:t>
+            </a:r>
+          </a:p>
+          <a:p>
+            <a:r>
+              <a:rPr lang="en-US" sz="2400" dirty="0" smtClean="0">
+                <a:solidFill>
                   <a:srgbClr val="660066"/>
                 </a:solidFill>
               </a:rPr>
-              <a:t>18:30	</a:t>
+              <a:t>17:</a:t>
+            </a:r>
+            <a:r>
+              <a:rPr lang="en-US" sz="2400" dirty="0" smtClean="0">
+                <a:solidFill>
+                  <a:srgbClr val="660066"/>
+                </a:solidFill>
+              </a:rPr>
+              <a:t>30	</a:t>
             </a:r>
             <a:r>
               <a:rPr lang="en-US" sz="2400" dirty="0" err="1" smtClean="0">
@@ -4654,15 +4931,7 @@
                   <a:srgbClr val="660066"/>
                 </a:solidFill>
               </a:rPr>
-              <a:t> Presentation </a:t>
-            </a:r>
-            <a:r>
-              <a:rPr lang="en-US" sz="2400" dirty="0" smtClean="0">
-                <a:solidFill>
-                  <a:srgbClr val="660066"/>
-                </a:solidFill>
-              </a:rPr>
-              <a:t>Slot</a:t>
+              <a:t> Presentation Slot</a:t>
             </a:r>
           </a:p>
           <a:p>
@@ -4727,6 +4996,133 @@
   <p:clrMapOvr>
     <a:masterClrMapping/>
   </p:clrMapOvr>
+  <p:timing>
+    <p:tnLst>
+      <p:par>
+        <p:cTn xmlns:p14="http://schemas.microsoft.com/office/powerpoint/2010/main" id="1" dur="indefinite" restart="never" nodeType="tmRoot"/>
+      </p:par>
+    </p:tnLst>
+  </p:timing>
+</p:sld>
+</file>
+
+<file path=ppt/slides/slide6.xml><?xml version="1.0" encoding="utf-8"?>
+<p:sld xmlns:a="http://schemas.openxmlformats.org/drawingml/2006/main" xmlns:r="http://schemas.openxmlformats.org/officeDocument/2006/relationships" xmlns:p="http://schemas.openxmlformats.org/presentationml/2006/main">
+  <p:cSld>
+    <p:spTree>
+      <p:nvGrpSpPr>
+        <p:cNvPr id="1" name=""/>
+        <p:cNvGrpSpPr/>
+        <p:nvPr/>
+      </p:nvGrpSpPr>
+      <p:grpSpPr>
+        <a:xfrm>
+          <a:off x="0" y="0"/>
+          <a:ext cx="0" cy="0"/>
+          <a:chOff x="0" y="0"/>
+          <a:chExt cx="0" cy="0"/>
+        </a:xfrm>
+      </p:grpSpPr>
+      <p:sp>
+        <p:nvSpPr>
+          <p:cNvPr id="5" name="Title 4"/>
+          <p:cNvSpPr>
+            <a:spLocks noGrp="1"/>
+          </p:cNvSpPr>
+          <p:nvPr>
+            <p:ph type="ctrTitle"/>
+          </p:nvPr>
+        </p:nvSpPr>
+        <p:spPr/>
+        <p:txBody>
+          <a:bodyPr/>
+          <a:lstStyle/>
+          <a:p>
+            <a:r>
+              <a:rPr lang="en-US" dirty="0" smtClean="0"/>
+              <a:t>Let’s get started!</a:t>
+            </a:r>
+            <a:endParaRPr lang="en-US" dirty="0"/>
+          </a:p>
+        </p:txBody>
+      </p:sp>
+      <p:sp>
+        <p:nvSpPr>
+          <p:cNvPr id="6" name="Subtitle 5"/>
+          <p:cNvSpPr>
+            <a:spLocks noGrp="1"/>
+          </p:cNvSpPr>
+          <p:nvPr>
+            <p:ph type="subTitle" idx="1"/>
+          </p:nvPr>
+        </p:nvSpPr>
+        <p:spPr/>
+        <p:txBody>
+          <a:bodyPr/>
+          <a:lstStyle/>
+          <a:p>
+            <a:endParaRPr lang="en-US"/>
+          </a:p>
+        </p:txBody>
+      </p:sp>
+      <p:sp>
+        <p:nvSpPr>
+          <p:cNvPr id="4" name="Slide Number Placeholder 3"/>
+          <p:cNvSpPr>
+            <a:spLocks noGrp="1"/>
+          </p:cNvSpPr>
+          <p:nvPr>
+            <p:ph type="sldNum" sz="quarter" idx="4294967295"/>
+          </p:nvPr>
+        </p:nvSpPr>
+        <p:spPr>
+          <a:xfrm>
+            <a:off x="7010400" y="6356350"/>
+            <a:ext cx="2133600" cy="365125"/>
+          </a:xfrm>
+        </p:spPr>
+        <p:txBody>
+          <a:bodyPr/>
+          <a:lstStyle/>
+          <a:p>
+            <a:fld id="{B07C5D84-2227-C144-B485-A8CA33CE4230}" type="slidenum">
+              <a:rPr lang="en-US" smtClean="0">
+                <a:solidFill>
+                  <a:prstClr val="black">
+                    <a:tint val="75000"/>
+                  </a:prstClr>
+                </a:solidFill>
+              </a:rPr>
+              <a:pPr/>
+              <a:t>6</a:t>
+            </a:fld>
+            <a:endParaRPr lang="en-US">
+              <a:solidFill>
+                <a:prstClr val="black">
+                  <a:tint val="75000"/>
+                </a:prstClr>
+              </a:solidFill>
+            </a:endParaRPr>
+          </a:p>
+        </p:txBody>
+      </p:sp>
+    </p:spTree>
+    <p:extLst>
+      <p:ext uri="{BB962C8B-B14F-4D97-AF65-F5344CB8AC3E}">
+        <p14:creationId xmlns:p14="http://schemas.microsoft.com/office/powerpoint/2010/main" val="1941750677"/>
+      </p:ext>
+    </p:extLst>
+  </p:cSld>
+  <p:clrMapOvr>
+    <a:masterClrMapping/>
+  </p:clrMapOvr>
+  <p:timing>
+    <p:tnLst>
+      <p:par>
+        <p:cTn xmlns:p14="http://schemas.microsoft.com/office/powerpoint/2010/main" id="1" dur="indefinite" restart="never" nodeType="tmRoot"/>
+      </p:par>
+    </p:tnLst>
+  </p:timing>
 </p:sld>
 </file>
 

</xml_diff>